<commit_message>
lat touches:: by sergio giraldo @ 20230227T0852CET, gpg signed
</commit_message>
<xml_diff>
--- a/ideas2.pptx
+++ b/ideas2.pptx
@@ -5310,12 +5310,12 @@
   </p:clrMapOvr>
   <mc:AlternateContent xmlns:mc="http://schemas.openxmlformats.org/markup-compatibility/2006">
     <mc:Choice xmlns:p159="http://schemas.microsoft.com/office/powerpoint/2015/09/main" Requires="p159">
-      <p:transition xmlns:p14="http://schemas.microsoft.com/office/powerpoint/2010/main" spd="slow" p14:dur="1750" advClick="0" advTm="0">
+      <p:transition advClick="0" advTm="0">
         <p159:morph option="byObject"/>
       </p:transition>
     </mc:Choice>
     <mc:Fallback>
-      <p:transition spd="slow" advClick="0" advTm="0">
+      <p:transition advClick="0" advTm="0">
         <p:fade/>
       </p:transition>
     </mc:Fallback>
@@ -5647,12 +5647,12 @@
   </p:clrMapOvr>
   <mc:AlternateContent xmlns:mc="http://schemas.openxmlformats.org/markup-compatibility/2006">
     <mc:Choice xmlns:p159="http://schemas.microsoft.com/office/powerpoint/2015/09/main" Requires="p159">
-      <p:transition spd="med" advClick="0" advTm="0">
+      <p:transition advClick="0" advTm="0">
         <p159:morph option="byObject"/>
       </p:transition>
     </mc:Choice>
     <mc:Fallback>
-      <p:transition spd="med" advClick="0" advTm="0">
+      <p:transition advClick="0" advTm="0">
         <p:fade/>
       </p:transition>
     </mc:Fallback>
@@ -5984,12 +5984,12 @@
   </p:clrMapOvr>
   <mc:AlternateContent xmlns:mc="http://schemas.openxmlformats.org/markup-compatibility/2006">
     <mc:Choice xmlns:p159="http://schemas.microsoft.com/office/powerpoint/2015/09/main" Requires="p159">
-      <p:transition spd="med" advClick="0" advTm="0">
+      <p:transition advClick="0" advTm="0">
         <p159:morph option="byObject"/>
       </p:transition>
     </mc:Choice>
     <mc:Fallback>
-      <p:transition spd="med" advClick="0" advTm="0">
+      <p:transition advClick="0" advTm="0">
         <p:fade/>
       </p:transition>
     </mc:Fallback>
@@ -6595,12 +6595,12 @@
   </p:clrMapOvr>
   <mc:AlternateContent xmlns:mc="http://schemas.openxmlformats.org/markup-compatibility/2006">
     <mc:Choice xmlns:p159="http://schemas.microsoft.com/office/powerpoint/2015/09/main" Requires="p159">
-      <p:transition spd="med" advClick="0" advTm="0">
+      <p:transition advClick="0" advTm="0">
         <p159:morph option="byObject"/>
       </p:transition>
     </mc:Choice>
     <mc:Fallback>
-      <p:transition spd="med" advClick="0" advTm="0">
+      <p:transition advClick="0" advTm="0">
         <p:fade/>
       </p:transition>
     </mc:Fallback>

</xml_diff>